<commit_message>
removed conditions slide in ppt
</commit_message>
<xml_diff>
--- a/Energy Load Forecasting Presentation.pptx
+++ b/Energy Load Forecasting Presentation.pptx
@@ -5,7 +5,7 @@
     <p:sldMasterId id="2147483672" r:id="rId1"/>
   </p:sldMasterIdLst>
   <p:notesMasterIdLst>
-    <p:notesMasterId r:id="rId14"/>
+    <p:notesMasterId r:id="rId13"/>
   </p:notesMasterIdLst>
   <p:sldIdLst>
     <p:sldId id="256" r:id="rId2"/>
@@ -13,13 +13,12 @@
     <p:sldId id="261" r:id="rId4"/>
     <p:sldId id="260" r:id="rId5"/>
     <p:sldId id="259" r:id="rId6"/>
-    <p:sldId id="258" r:id="rId7"/>
-    <p:sldId id="262" r:id="rId8"/>
-    <p:sldId id="264" r:id="rId9"/>
-    <p:sldId id="265" r:id="rId10"/>
-    <p:sldId id="266" r:id="rId11"/>
-    <p:sldId id="263" r:id="rId12"/>
-    <p:sldId id="267" r:id="rId13"/>
+    <p:sldId id="262" r:id="rId7"/>
+    <p:sldId id="264" r:id="rId8"/>
+    <p:sldId id="265" r:id="rId9"/>
+    <p:sldId id="266" r:id="rId10"/>
+    <p:sldId id="263" r:id="rId11"/>
+    <p:sldId id="267" r:id="rId12"/>
   </p:sldIdLst>
   <p:sldSz cx="24377650" cy="13716000"/>
   <p:notesSz cx="6858000" cy="9144000"/>
@@ -208,7 +207,7 @@
           <a:p>
             <a:fld id="{E155AE47-800F-41BA-A438-298BDA569DB8}" type="datetimeFigureOut">
               <a:rPr lang="en-US" smtClean="0"/>
-              <a:t>3/31/2019</a:t>
+              <a:t>4/1/2019</a:t>
             </a:fld>
             <a:endParaRPr lang="en-US"/>
           </a:p>
@@ -606,7 +605,7 @@
           <a:p>
             <a:fld id="{262C55C8-781F-4DD3-A9FD-99B01A856194}" type="datetimeFigureOut">
               <a:rPr lang="en-US" smtClean="0"/>
-              <a:t>3/31/2019</a:t>
+              <a:t>4/1/2019</a:t>
             </a:fld>
             <a:endParaRPr lang="en-US"/>
           </a:p>
@@ -776,7 +775,7 @@
           <a:p>
             <a:fld id="{262C55C8-781F-4DD3-A9FD-99B01A856194}" type="datetimeFigureOut">
               <a:rPr lang="en-US" smtClean="0"/>
-              <a:t>3/31/2019</a:t>
+              <a:t>4/1/2019</a:t>
             </a:fld>
             <a:endParaRPr lang="en-US"/>
           </a:p>
@@ -956,7 +955,7 @@
           <a:p>
             <a:fld id="{262C55C8-781F-4DD3-A9FD-99B01A856194}" type="datetimeFigureOut">
               <a:rPr lang="en-US" smtClean="0"/>
-              <a:t>3/31/2019</a:t>
+              <a:t>4/1/2019</a:t>
             </a:fld>
             <a:endParaRPr lang="en-US"/>
           </a:p>
@@ -1126,7 +1125,7 @@
           <a:p>
             <a:fld id="{262C55C8-781F-4DD3-A9FD-99B01A856194}" type="datetimeFigureOut">
               <a:rPr lang="en-US" smtClean="0"/>
-              <a:t>3/31/2019</a:t>
+              <a:t>4/1/2019</a:t>
             </a:fld>
             <a:endParaRPr lang="en-US"/>
           </a:p>
@@ -1372,7 +1371,7 @@
           <a:p>
             <a:fld id="{262C55C8-781F-4DD3-A9FD-99B01A856194}" type="datetimeFigureOut">
               <a:rPr lang="en-US" smtClean="0"/>
-              <a:t>3/31/2019</a:t>
+              <a:t>4/1/2019</a:t>
             </a:fld>
             <a:endParaRPr lang="en-US"/>
           </a:p>
@@ -1604,7 +1603,7 @@
           <a:p>
             <a:fld id="{262C55C8-781F-4DD3-A9FD-99B01A856194}" type="datetimeFigureOut">
               <a:rPr lang="en-US" smtClean="0"/>
-              <a:t>3/31/2019</a:t>
+              <a:t>4/1/2019</a:t>
             </a:fld>
             <a:endParaRPr lang="en-US"/>
           </a:p>
@@ -1971,7 +1970,7 @@
           <a:p>
             <a:fld id="{262C55C8-781F-4DD3-A9FD-99B01A856194}" type="datetimeFigureOut">
               <a:rPr lang="en-US" smtClean="0"/>
-              <a:t>3/31/2019</a:t>
+              <a:t>4/1/2019</a:t>
             </a:fld>
             <a:endParaRPr lang="en-US"/>
           </a:p>
@@ -2089,7 +2088,7 @@
           <a:p>
             <a:fld id="{262C55C8-781F-4DD3-A9FD-99B01A856194}" type="datetimeFigureOut">
               <a:rPr lang="en-US" smtClean="0"/>
-              <a:t>3/31/2019</a:t>
+              <a:t>4/1/2019</a:t>
             </a:fld>
             <a:endParaRPr lang="en-US"/>
           </a:p>
@@ -2184,7 +2183,7 @@
           <a:p>
             <a:fld id="{262C55C8-781F-4DD3-A9FD-99B01A856194}" type="datetimeFigureOut">
               <a:rPr lang="en-US" smtClean="0"/>
-              <a:t>3/31/2019</a:t>
+              <a:t>4/1/2019</a:t>
             </a:fld>
             <a:endParaRPr lang="en-US"/>
           </a:p>
@@ -2461,7 +2460,7 @@
           <a:p>
             <a:fld id="{262C55C8-781F-4DD3-A9FD-99B01A856194}" type="datetimeFigureOut">
               <a:rPr lang="en-US" smtClean="0"/>
-              <a:t>3/31/2019</a:t>
+              <a:t>4/1/2019</a:t>
             </a:fld>
             <a:endParaRPr lang="en-US"/>
           </a:p>
@@ -2718,7 +2717,7 @@
           <a:p>
             <a:fld id="{262C55C8-781F-4DD3-A9FD-99B01A856194}" type="datetimeFigureOut">
               <a:rPr lang="en-US" smtClean="0"/>
-              <a:t>3/31/2019</a:t>
+              <a:t>4/1/2019</a:t>
             </a:fld>
             <a:endParaRPr lang="en-US"/>
           </a:p>
@@ -2936,7 +2935,7 @@
           <a:p>
             <a:fld id="{262C55C8-781F-4DD3-A9FD-99B01A856194}" type="datetimeFigureOut">
               <a:rPr lang="en-US" smtClean="0"/>
-              <a:t>3/31/2019</a:t>
+              <a:t>4/1/2019</a:t>
             </a:fld>
             <a:endParaRPr lang="en-US"/>
           </a:p>
@@ -3423,94 +3422,6 @@
           <a:chExt cx="0" cy="0"/>
         </a:xfrm>
       </p:grpSpPr>
-      <p:sp>
-        <p:nvSpPr>
-          <p:cNvPr id="2" name="Title 1">
-            <a:extLst>
-              <a:ext uri="{FF2B5EF4-FFF2-40B4-BE49-F238E27FC236}">
-                <a16:creationId xmlns:a16="http://schemas.microsoft.com/office/drawing/2014/main" id="{EFCFA682-6647-4A75-A3D7-0544205A251D}"/>
-              </a:ext>
-            </a:extLst>
-          </p:cNvPr>
-          <p:cNvSpPr>
-            <a:spLocks noGrp="1"/>
-          </p:cNvSpPr>
-          <p:nvPr>
-            <p:ph type="title"/>
-          </p:nvPr>
-        </p:nvSpPr>
-        <p:spPr/>
-        <p:txBody>
-          <a:bodyPr/>
-          <a:lstStyle/>
-          <a:p>
-            <a:r>
-              <a:rPr lang="en-US" dirty="0"/>
-              <a:t>Code:</a:t>
-            </a:r>
-          </a:p>
-        </p:txBody>
-      </p:sp>
-      <p:pic>
-        <p:nvPicPr>
-          <p:cNvPr id="4" name="Picture 3">
-            <a:extLst>
-              <a:ext uri="{FF2B5EF4-FFF2-40B4-BE49-F238E27FC236}">
-                <a16:creationId xmlns:a16="http://schemas.microsoft.com/office/drawing/2014/main" id="{30331A1A-88E5-4917-BE86-3FE2C32D0F8B}"/>
-              </a:ext>
-            </a:extLst>
-          </p:cNvPr>
-          <p:cNvPicPr>
-            <a:picLocks noChangeAspect="1"/>
-          </p:cNvPicPr>
-          <p:nvPr/>
-        </p:nvPicPr>
-        <p:blipFill>
-          <a:blip r:embed="rId2"/>
-          <a:stretch>
-            <a:fillRect/>
-          </a:stretch>
-        </p:blipFill>
-        <p:spPr>
-          <a:xfrm>
-            <a:off x="4946967" y="730251"/>
-            <a:ext cx="18735537" cy="11990069"/>
-          </a:xfrm>
-          <a:prstGeom prst="rect">
-            <a:avLst/>
-          </a:prstGeom>
-        </p:spPr>
-      </p:pic>
-    </p:spTree>
-    <p:extLst>
-      <p:ext uri="{BB962C8B-B14F-4D97-AF65-F5344CB8AC3E}">
-        <p14:creationId xmlns:p14="http://schemas.microsoft.com/office/powerpoint/2010/main" val="2077878785"/>
-      </p:ext>
-    </p:extLst>
-  </p:cSld>
-  <p:clrMapOvr>
-    <a:masterClrMapping/>
-  </p:clrMapOvr>
-</p:sld>
-</file>
-
-<file path=ppt/slides/slide11.xml><?xml version="1.0" encoding="utf-8"?>
-<p:sld xmlns:a="http://schemas.openxmlformats.org/drawingml/2006/main" xmlns:r="http://schemas.openxmlformats.org/officeDocument/2006/relationships" xmlns:p="http://schemas.openxmlformats.org/presentationml/2006/main">
-  <p:cSld>
-    <p:spTree>
-      <p:nvGrpSpPr>
-        <p:cNvPr id="1" name=""/>
-        <p:cNvGrpSpPr/>
-        <p:nvPr/>
-      </p:nvGrpSpPr>
-      <p:grpSpPr>
-        <a:xfrm>
-          <a:off x="0" y="0"/>
-          <a:ext cx="0" cy="0"/>
-          <a:chOff x="0" y="0"/>
-          <a:chExt cx="0" cy="0"/>
-        </a:xfrm>
-      </p:grpSpPr>
       <p:pic>
         <p:nvPicPr>
           <p:cNvPr id="2" name="Picture 1">
@@ -3589,7 +3500,7 @@
 </p:sld>
 </file>
 
-<file path=ppt/slides/slide12.xml><?xml version="1.0" encoding="utf-8"?>
+<file path=ppt/slides/slide11.xml><?xml version="1.0" encoding="utf-8"?>
 <p:sld xmlns:a="http://schemas.openxmlformats.org/drawingml/2006/main" xmlns:r="http://schemas.openxmlformats.org/officeDocument/2006/relationships" xmlns:p="http://schemas.openxmlformats.org/presentationml/2006/main">
   <p:cSld>
     <p:spTree>
@@ -4243,101 +4154,6 @@
           <p:cNvPr id="2" name="Title 1">
             <a:extLst>
               <a:ext uri="{FF2B5EF4-FFF2-40B4-BE49-F238E27FC236}">
-                <a16:creationId xmlns:a16="http://schemas.microsoft.com/office/drawing/2014/main" id="{DA5396B1-C272-4590-A0A4-5AF7A840F2BF}"/>
-              </a:ext>
-            </a:extLst>
-          </p:cNvPr>
-          <p:cNvSpPr>
-            <a:spLocks noGrp="1"/>
-          </p:cNvSpPr>
-          <p:nvPr>
-            <p:ph type="title"/>
-          </p:nvPr>
-        </p:nvSpPr>
-        <p:spPr>
-          <a:xfrm>
-            <a:off x="254066" y="4206874"/>
-            <a:ext cx="21025723" cy="2651126"/>
-          </a:xfrm>
-        </p:spPr>
-        <p:txBody>
-          <a:bodyPr/>
-          <a:lstStyle/>
-          <a:p>
-            <a:r>
-              <a:rPr lang="en-US" dirty="0"/>
-              <a:t>Conditions vs Load</a:t>
-            </a:r>
-          </a:p>
-        </p:txBody>
-      </p:sp>
-      <p:pic>
-        <p:nvPicPr>
-          <p:cNvPr id="4" name="Content Placeholder 3">
-            <a:extLst>
-              <a:ext uri="{FF2B5EF4-FFF2-40B4-BE49-F238E27FC236}">
-                <a16:creationId xmlns:a16="http://schemas.microsoft.com/office/drawing/2014/main" id="{11752571-E583-45A0-AA2F-EB0A4942A231}"/>
-              </a:ext>
-            </a:extLst>
-          </p:cNvPr>
-          <p:cNvPicPr>
-            <a:picLocks noGrp="1" noChangeAspect="1"/>
-          </p:cNvPicPr>
-          <p:nvPr>
-            <p:ph idx="1"/>
-          </p:nvPr>
-        </p:nvPicPr>
-        <p:blipFill>
-          <a:blip r:embed="rId2"/>
-          <a:stretch>
-            <a:fillRect/>
-          </a:stretch>
-        </p:blipFill>
-        <p:spPr>
-          <a:xfrm>
-            <a:off x="9005643" y="730251"/>
-            <a:ext cx="15117941" cy="11786869"/>
-          </a:xfrm>
-          <a:prstGeom prst="rect">
-            <a:avLst/>
-          </a:prstGeom>
-        </p:spPr>
-      </p:pic>
-    </p:spTree>
-    <p:extLst>
-      <p:ext uri="{BB962C8B-B14F-4D97-AF65-F5344CB8AC3E}">
-        <p14:creationId xmlns:p14="http://schemas.microsoft.com/office/powerpoint/2010/main" val="3035732574"/>
-      </p:ext>
-    </p:extLst>
-  </p:cSld>
-  <p:clrMapOvr>
-    <a:masterClrMapping/>
-  </p:clrMapOvr>
-</p:sld>
-</file>
-
-<file path=ppt/slides/slide7.xml><?xml version="1.0" encoding="utf-8"?>
-<p:sld xmlns:a="http://schemas.openxmlformats.org/drawingml/2006/main" xmlns:r="http://schemas.openxmlformats.org/officeDocument/2006/relationships" xmlns:p="http://schemas.openxmlformats.org/presentationml/2006/main">
-  <p:cSld>
-    <p:spTree>
-      <p:nvGrpSpPr>
-        <p:cNvPr id="1" name=""/>
-        <p:cNvGrpSpPr/>
-        <p:nvPr/>
-      </p:nvGrpSpPr>
-      <p:grpSpPr>
-        <a:xfrm>
-          <a:off x="0" y="0"/>
-          <a:ext cx="0" cy="0"/>
-          <a:chOff x="0" y="0"/>
-          <a:chExt cx="0" cy="0"/>
-        </a:xfrm>
-      </p:grpSpPr>
-      <p:sp>
-        <p:nvSpPr>
-          <p:cNvPr id="2" name="Title 1">
-            <a:extLst>
-              <a:ext uri="{FF2B5EF4-FFF2-40B4-BE49-F238E27FC236}">
                 <a16:creationId xmlns:a16="http://schemas.microsoft.com/office/drawing/2014/main" id="{EFCFA682-6647-4A75-A3D7-0544205A251D}"/>
               </a:ext>
             </a:extLst>
@@ -4406,7 +4222,7 @@
 </p:sld>
 </file>
 
-<file path=ppt/slides/slide8.xml><?xml version="1.0" encoding="utf-8"?>
+<file path=ppt/slides/slide7.xml><?xml version="1.0" encoding="utf-8"?>
 <p:sld xmlns:a="http://schemas.openxmlformats.org/drawingml/2006/main" xmlns:r="http://schemas.openxmlformats.org/officeDocument/2006/relationships" xmlns:p="http://schemas.openxmlformats.org/presentationml/2006/main">
   <p:cSld>
     <p:spTree>
@@ -4494,7 +4310,7 @@
 </p:sld>
 </file>
 
-<file path=ppt/slides/slide9.xml><?xml version="1.0" encoding="utf-8"?>
+<file path=ppt/slides/slide8.xml><?xml version="1.0" encoding="utf-8"?>
 <p:sld xmlns:a="http://schemas.openxmlformats.org/drawingml/2006/main" xmlns:r="http://schemas.openxmlformats.org/officeDocument/2006/relationships" xmlns:p="http://schemas.openxmlformats.org/presentationml/2006/main">
   <p:cSld>
     <p:spTree>
@@ -4573,6 +4389,94 @@
     <p:extLst>
       <p:ext uri="{BB962C8B-B14F-4D97-AF65-F5344CB8AC3E}">
         <p14:creationId xmlns:p14="http://schemas.microsoft.com/office/powerpoint/2010/main" val="893225966"/>
+      </p:ext>
+    </p:extLst>
+  </p:cSld>
+  <p:clrMapOvr>
+    <a:masterClrMapping/>
+  </p:clrMapOvr>
+</p:sld>
+</file>
+
+<file path=ppt/slides/slide9.xml><?xml version="1.0" encoding="utf-8"?>
+<p:sld xmlns:a="http://schemas.openxmlformats.org/drawingml/2006/main" xmlns:r="http://schemas.openxmlformats.org/officeDocument/2006/relationships" xmlns:p="http://schemas.openxmlformats.org/presentationml/2006/main">
+  <p:cSld>
+    <p:spTree>
+      <p:nvGrpSpPr>
+        <p:cNvPr id="1" name=""/>
+        <p:cNvGrpSpPr/>
+        <p:nvPr/>
+      </p:nvGrpSpPr>
+      <p:grpSpPr>
+        <a:xfrm>
+          <a:off x="0" y="0"/>
+          <a:ext cx="0" cy="0"/>
+          <a:chOff x="0" y="0"/>
+          <a:chExt cx="0" cy="0"/>
+        </a:xfrm>
+      </p:grpSpPr>
+      <p:sp>
+        <p:nvSpPr>
+          <p:cNvPr id="2" name="Title 1">
+            <a:extLst>
+              <a:ext uri="{FF2B5EF4-FFF2-40B4-BE49-F238E27FC236}">
+                <a16:creationId xmlns:a16="http://schemas.microsoft.com/office/drawing/2014/main" id="{EFCFA682-6647-4A75-A3D7-0544205A251D}"/>
+              </a:ext>
+            </a:extLst>
+          </p:cNvPr>
+          <p:cNvSpPr>
+            <a:spLocks noGrp="1"/>
+          </p:cNvSpPr>
+          <p:nvPr>
+            <p:ph type="title"/>
+          </p:nvPr>
+        </p:nvSpPr>
+        <p:spPr/>
+        <p:txBody>
+          <a:bodyPr/>
+          <a:lstStyle/>
+          <a:p>
+            <a:r>
+              <a:rPr lang="en-US" dirty="0"/>
+              <a:t>Code:</a:t>
+            </a:r>
+          </a:p>
+        </p:txBody>
+      </p:sp>
+      <p:pic>
+        <p:nvPicPr>
+          <p:cNvPr id="4" name="Picture 3">
+            <a:extLst>
+              <a:ext uri="{FF2B5EF4-FFF2-40B4-BE49-F238E27FC236}">
+                <a16:creationId xmlns:a16="http://schemas.microsoft.com/office/drawing/2014/main" id="{30331A1A-88E5-4917-BE86-3FE2C32D0F8B}"/>
+              </a:ext>
+            </a:extLst>
+          </p:cNvPr>
+          <p:cNvPicPr>
+            <a:picLocks noChangeAspect="1"/>
+          </p:cNvPicPr>
+          <p:nvPr/>
+        </p:nvPicPr>
+        <p:blipFill>
+          <a:blip r:embed="rId2"/>
+          <a:stretch>
+            <a:fillRect/>
+          </a:stretch>
+        </p:blipFill>
+        <p:spPr>
+          <a:xfrm>
+            <a:off x="4946967" y="730251"/>
+            <a:ext cx="18735537" cy="11990069"/>
+          </a:xfrm>
+          <a:prstGeom prst="rect">
+            <a:avLst/>
+          </a:prstGeom>
+        </p:spPr>
+      </p:pic>
+    </p:spTree>
+    <p:extLst>
+      <p:ext uri="{BB962C8B-B14F-4D97-AF65-F5344CB8AC3E}">
+        <p14:creationId xmlns:p14="http://schemas.microsoft.com/office/powerpoint/2010/main" val="2077878785"/>
       </p:ext>
     </p:extLst>
   </p:cSld>

</xml_diff>

<commit_message>
updated presentation, added images
</commit_message>
<xml_diff>
--- a/Energy Load Forecasting Presentation.pptx
+++ b/Energy Load Forecasting Presentation.pptx
@@ -5,7 +5,7 @@
     <p:sldMasterId id="2147483672" r:id="rId1"/>
   </p:sldMasterIdLst>
   <p:notesMasterIdLst>
-    <p:notesMasterId r:id="rId13"/>
+    <p:notesMasterId r:id="rId16"/>
   </p:notesMasterIdLst>
   <p:sldIdLst>
     <p:sldId id="256" r:id="rId2"/>
@@ -19,6 +19,9 @@
     <p:sldId id="266" r:id="rId10"/>
     <p:sldId id="263" r:id="rId11"/>
     <p:sldId id="267" r:id="rId12"/>
+    <p:sldId id="268" r:id="rId13"/>
+    <p:sldId id="269" r:id="rId14"/>
+    <p:sldId id="270" r:id="rId15"/>
   </p:sldIdLst>
   <p:sldSz cx="24377650" cy="13716000"/>
   <p:notesSz cx="6858000" cy="9144000"/>
@@ -207,7 +210,7 @@
           <a:p>
             <a:fld id="{E155AE47-800F-41BA-A438-298BDA569DB8}" type="datetimeFigureOut">
               <a:rPr lang="en-US" smtClean="0"/>
-              <a:t>4/1/2019</a:t>
+              <a:t>6/2/2019</a:t>
             </a:fld>
             <a:endParaRPr lang="en-US"/>
           </a:p>
@@ -605,7 +608,7 @@
           <a:p>
             <a:fld id="{262C55C8-781F-4DD3-A9FD-99B01A856194}" type="datetimeFigureOut">
               <a:rPr lang="en-US" smtClean="0"/>
-              <a:t>4/1/2019</a:t>
+              <a:t>6/2/2019</a:t>
             </a:fld>
             <a:endParaRPr lang="en-US"/>
           </a:p>
@@ -775,7 +778,7 @@
           <a:p>
             <a:fld id="{262C55C8-781F-4DD3-A9FD-99B01A856194}" type="datetimeFigureOut">
               <a:rPr lang="en-US" smtClean="0"/>
-              <a:t>4/1/2019</a:t>
+              <a:t>6/2/2019</a:t>
             </a:fld>
             <a:endParaRPr lang="en-US"/>
           </a:p>
@@ -955,7 +958,7 @@
           <a:p>
             <a:fld id="{262C55C8-781F-4DD3-A9FD-99B01A856194}" type="datetimeFigureOut">
               <a:rPr lang="en-US" smtClean="0"/>
-              <a:t>4/1/2019</a:t>
+              <a:t>6/2/2019</a:t>
             </a:fld>
             <a:endParaRPr lang="en-US"/>
           </a:p>
@@ -1125,7 +1128,7 @@
           <a:p>
             <a:fld id="{262C55C8-781F-4DD3-A9FD-99B01A856194}" type="datetimeFigureOut">
               <a:rPr lang="en-US" smtClean="0"/>
-              <a:t>4/1/2019</a:t>
+              <a:t>6/2/2019</a:t>
             </a:fld>
             <a:endParaRPr lang="en-US"/>
           </a:p>
@@ -1371,7 +1374,7 @@
           <a:p>
             <a:fld id="{262C55C8-781F-4DD3-A9FD-99B01A856194}" type="datetimeFigureOut">
               <a:rPr lang="en-US" smtClean="0"/>
-              <a:t>4/1/2019</a:t>
+              <a:t>6/2/2019</a:t>
             </a:fld>
             <a:endParaRPr lang="en-US"/>
           </a:p>
@@ -1603,7 +1606,7 @@
           <a:p>
             <a:fld id="{262C55C8-781F-4DD3-A9FD-99B01A856194}" type="datetimeFigureOut">
               <a:rPr lang="en-US" smtClean="0"/>
-              <a:t>4/1/2019</a:t>
+              <a:t>6/2/2019</a:t>
             </a:fld>
             <a:endParaRPr lang="en-US"/>
           </a:p>
@@ -1970,7 +1973,7 @@
           <a:p>
             <a:fld id="{262C55C8-781F-4DD3-A9FD-99B01A856194}" type="datetimeFigureOut">
               <a:rPr lang="en-US" smtClean="0"/>
-              <a:t>4/1/2019</a:t>
+              <a:t>6/2/2019</a:t>
             </a:fld>
             <a:endParaRPr lang="en-US"/>
           </a:p>
@@ -2088,7 +2091,7 @@
           <a:p>
             <a:fld id="{262C55C8-781F-4DD3-A9FD-99B01A856194}" type="datetimeFigureOut">
               <a:rPr lang="en-US" smtClean="0"/>
-              <a:t>4/1/2019</a:t>
+              <a:t>6/2/2019</a:t>
             </a:fld>
             <a:endParaRPr lang="en-US"/>
           </a:p>
@@ -2183,7 +2186,7 @@
           <a:p>
             <a:fld id="{262C55C8-781F-4DD3-A9FD-99B01A856194}" type="datetimeFigureOut">
               <a:rPr lang="en-US" smtClean="0"/>
-              <a:t>4/1/2019</a:t>
+              <a:t>6/2/2019</a:t>
             </a:fld>
             <a:endParaRPr lang="en-US"/>
           </a:p>
@@ -2460,7 +2463,7 @@
           <a:p>
             <a:fld id="{262C55C8-781F-4DD3-A9FD-99B01A856194}" type="datetimeFigureOut">
               <a:rPr lang="en-US" smtClean="0"/>
-              <a:t>4/1/2019</a:t>
+              <a:t>6/2/2019</a:t>
             </a:fld>
             <a:endParaRPr lang="en-US"/>
           </a:p>
@@ -2717,7 +2720,7 @@
           <a:p>
             <a:fld id="{262C55C8-781F-4DD3-A9FD-99B01A856194}" type="datetimeFigureOut">
               <a:rPr lang="en-US" smtClean="0"/>
-              <a:t>4/1/2019</a:t>
+              <a:t>6/2/2019</a:t>
             </a:fld>
             <a:endParaRPr lang="en-US"/>
           </a:p>
@@ -2935,7 +2938,7 @@
           <a:p>
             <a:fld id="{262C55C8-781F-4DD3-A9FD-99B01A856194}" type="datetimeFigureOut">
               <a:rPr lang="en-US" smtClean="0"/>
-              <a:t>4/1/2019</a:t>
+              <a:t>6/2/2019</a:t>
             </a:fld>
             <a:endParaRPr lang="en-US"/>
           </a:p>
@@ -3444,7 +3447,7 @@
         </p:blipFill>
         <p:spPr>
           <a:xfrm>
-            <a:off x="4204176" y="1200329"/>
+            <a:off x="8185793" y="1200329"/>
             <a:ext cx="15969298" cy="12238304"/>
           </a:xfrm>
           <a:prstGeom prst="rect">
@@ -3481,8 +3484,44 @@
           <a:lstStyle/>
           <a:p>
             <a:r>
-              <a:rPr lang="en-US" sz="7200" dirty="0"/>
+              <a:rPr lang="en-US" sz="7200"/>
               <a:t>Model Predictions</a:t>
+            </a:r>
+            <a:endParaRPr lang="en-US" sz="7200" dirty="0"/>
+          </a:p>
+        </p:txBody>
+      </p:sp>
+      <p:sp>
+        <p:nvSpPr>
+          <p:cNvPr id="4" name="TextBox 3">
+            <a:extLst>
+              <a:ext uri="{FF2B5EF4-FFF2-40B4-BE49-F238E27FC236}">
+                <a16:creationId xmlns:a16="http://schemas.microsoft.com/office/drawing/2014/main" id="{D200E99E-765A-4C79-B4C2-A15BE323BA51}"/>
+              </a:ext>
+            </a:extLst>
+          </p:cNvPr>
+          <p:cNvSpPr txBox="1"/>
+          <p:nvPr/>
+        </p:nvSpPr>
+        <p:spPr>
+          <a:xfrm>
+            <a:off x="631767" y="1995055"/>
+            <a:ext cx="7554026" cy="2307811"/>
+          </a:xfrm>
+          <a:prstGeom prst="rect">
+            <a:avLst/>
+          </a:prstGeom>
+          <a:noFill/>
+        </p:spPr>
+        <p:txBody>
+          <a:bodyPr wrap="square" rtlCol="0">
+            <a:spAutoFit/>
+          </a:bodyPr>
+          <a:lstStyle/>
+          <a:p>
+            <a:r>
+              <a:rPr lang="en-US" dirty="0"/>
+              <a:t>Taking the results of the test set in the model, we can compare them to the historical data and see how the model performs in a visual way. </a:t>
             </a:r>
           </a:p>
         </p:txBody>
@@ -3531,8 +3570,8 @@
         </p:nvSpPr>
         <p:spPr>
           <a:xfrm>
-            <a:off x="10713840" y="4482353"/>
-            <a:ext cx="2679431" cy="1200329"/>
+            <a:off x="7417319" y="4548855"/>
+            <a:ext cx="9543011" cy="1200329"/>
           </a:xfrm>
           <a:prstGeom prst="rect">
             <a:avLst/>
@@ -3545,10 +3584,12 @@
           </a:bodyPr>
           <a:lstStyle/>
           <a:p>
-            <a:r>
-              <a:rPr lang="en-US" sz="7200" dirty="0"/>
-              <a:t>App…</a:t>
-            </a:r>
+            <a:pPr algn="ctr"/>
+            <a:r>
+              <a:rPr lang="en-US" sz="7200"/>
+              <a:t>Running The Application</a:t>
+            </a:r>
+            <a:endParaRPr lang="en-US" sz="7200" dirty="0"/>
           </a:p>
         </p:txBody>
       </p:sp>
@@ -3556,6 +3597,434 @@
     <p:extLst>
       <p:ext uri="{BB962C8B-B14F-4D97-AF65-F5344CB8AC3E}">
         <p14:creationId xmlns:p14="http://schemas.microsoft.com/office/powerpoint/2010/main" val="2357290838"/>
+      </p:ext>
+    </p:extLst>
+  </p:cSld>
+  <p:clrMapOvr>
+    <a:masterClrMapping/>
+  </p:clrMapOvr>
+</p:sld>
+</file>
+
+<file path=ppt/slides/slide12.xml><?xml version="1.0" encoding="utf-8"?>
+<p:sld xmlns:a="http://schemas.openxmlformats.org/drawingml/2006/main" xmlns:r="http://schemas.openxmlformats.org/officeDocument/2006/relationships" xmlns:p="http://schemas.openxmlformats.org/presentationml/2006/main">
+  <p:cSld>
+    <p:spTree>
+      <p:nvGrpSpPr>
+        <p:cNvPr id="1" name=""/>
+        <p:cNvGrpSpPr/>
+        <p:nvPr/>
+      </p:nvGrpSpPr>
+      <p:grpSpPr>
+        <a:xfrm>
+          <a:off x="0" y="0"/>
+          <a:ext cx="0" cy="0"/>
+          <a:chOff x="0" y="0"/>
+          <a:chExt cx="0" cy="0"/>
+        </a:xfrm>
+      </p:grpSpPr>
+      <p:pic>
+        <p:nvPicPr>
+          <p:cNvPr id="2" name="Picture 1">
+            <a:extLst>
+              <a:ext uri="{FF2B5EF4-FFF2-40B4-BE49-F238E27FC236}">
+                <a16:creationId xmlns:a16="http://schemas.microsoft.com/office/drawing/2014/main" id="{7D142C10-4AE1-4B97-9D63-619E72CD73A5}"/>
+              </a:ext>
+            </a:extLst>
+          </p:cNvPr>
+          <p:cNvPicPr>
+            <a:picLocks noChangeAspect="1"/>
+          </p:cNvPicPr>
+          <p:nvPr/>
+        </p:nvPicPr>
+        <p:blipFill>
+          <a:blip r:embed="rId2"/>
+          <a:stretch>
+            <a:fillRect/>
+          </a:stretch>
+        </p:blipFill>
+        <p:spPr>
+          <a:xfrm>
+            <a:off x="6359586" y="2045015"/>
+            <a:ext cx="17747552" cy="8726118"/>
+          </a:xfrm>
+          <a:prstGeom prst="rect">
+            <a:avLst/>
+          </a:prstGeom>
+        </p:spPr>
+      </p:pic>
+      <p:sp>
+        <p:nvSpPr>
+          <p:cNvPr id="3" name="TextBox 2">
+            <a:extLst>
+              <a:ext uri="{FF2B5EF4-FFF2-40B4-BE49-F238E27FC236}">
+                <a16:creationId xmlns:a16="http://schemas.microsoft.com/office/drawing/2014/main" id="{EC3DF77A-9721-43E0-94D2-6C4DA8721080}"/>
+              </a:ext>
+            </a:extLst>
+          </p:cNvPr>
+          <p:cNvSpPr txBox="1"/>
+          <p:nvPr/>
+        </p:nvSpPr>
+        <p:spPr>
+          <a:xfrm>
+            <a:off x="9445625" y="838479"/>
+            <a:ext cx="5486400" cy="830997"/>
+          </a:xfrm>
+          <a:prstGeom prst="rect">
+            <a:avLst/>
+          </a:prstGeom>
+          <a:noFill/>
+        </p:spPr>
+        <p:txBody>
+          <a:bodyPr wrap="square" rtlCol="0">
+            <a:spAutoFit/>
+          </a:bodyPr>
+          <a:lstStyle/>
+          <a:p>
+            <a:pPr algn="ctr"/>
+            <a:r>
+              <a:rPr lang="en-US" sz="4800" b="1" u="sng" dirty="0"/>
+              <a:t>Home Page</a:t>
+            </a:r>
+          </a:p>
+        </p:txBody>
+      </p:sp>
+      <p:sp>
+        <p:nvSpPr>
+          <p:cNvPr id="4" name="TextBox 3">
+            <a:extLst>
+              <a:ext uri="{FF2B5EF4-FFF2-40B4-BE49-F238E27FC236}">
+                <a16:creationId xmlns:a16="http://schemas.microsoft.com/office/drawing/2014/main" id="{7880A41F-36ED-422C-B28D-CA6AF19A00E1}"/>
+              </a:ext>
+            </a:extLst>
+          </p:cNvPr>
+          <p:cNvSpPr txBox="1"/>
+          <p:nvPr/>
+        </p:nvSpPr>
+        <p:spPr>
+          <a:xfrm>
+            <a:off x="615142" y="2244436"/>
+            <a:ext cx="5744444" cy="7846507"/>
+          </a:xfrm>
+          <a:prstGeom prst="rect">
+            <a:avLst/>
+          </a:prstGeom>
+          <a:noFill/>
+        </p:spPr>
+        <p:txBody>
+          <a:bodyPr wrap="square" rtlCol="0">
+            <a:spAutoFit/>
+          </a:bodyPr>
+          <a:lstStyle/>
+          <a:p>
+            <a:r>
+              <a:rPr lang="en-US" dirty="0"/>
+              <a:t>The homepage provides a background of what the application aims to accomplish.</a:t>
+            </a:r>
+          </a:p>
+          <a:p>
+            <a:endParaRPr lang="en-US" dirty="0"/>
+          </a:p>
+          <a:p>
+            <a:r>
+              <a:rPr lang="en-US" dirty="0"/>
+              <a:t>From here you can click the “Model” link in the top left to run predictions on projected weather forecasts.</a:t>
+            </a:r>
+          </a:p>
+          <a:p>
+            <a:endParaRPr lang="en-US" dirty="0"/>
+          </a:p>
+          <a:p>
+            <a:r>
+              <a:rPr lang="en-US" dirty="0"/>
+              <a:t>You can also click the “Dashboard” link to be taken to a Tableau dashboard of the data that was collected. </a:t>
+            </a:r>
+          </a:p>
+        </p:txBody>
+      </p:sp>
+    </p:spTree>
+    <p:extLst>
+      <p:ext uri="{BB962C8B-B14F-4D97-AF65-F5344CB8AC3E}">
+        <p14:creationId xmlns:p14="http://schemas.microsoft.com/office/powerpoint/2010/main" val="1448366270"/>
+      </p:ext>
+    </p:extLst>
+  </p:cSld>
+  <p:clrMapOvr>
+    <a:masterClrMapping/>
+  </p:clrMapOvr>
+</p:sld>
+</file>
+
+<file path=ppt/slides/slide13.xml><?xml version="1.0" encoding="utf-8"?>
+<p:sld xmlns:a="http://schemas.openxmlformats.org/drawingml/2006/main" xmlns:r="http://schemas.openxmlformats.org/officeDocument/2006/relationships" xmlns:p="http://schemas.openxmlformats.org/presentationml/2006/main">
+  <p:cSld>
+    <p:spTree>
+      <p:nvGrpSpPr>
+        <p:cNvPr id="1" name=""/>
+        <p:cNvGrpSpPr/>
+        <p:nvPr/>
+      </p:nvGrpSpPr>
+      <p:grpSpPr>
+        <a:xfrm>
+          <a:off x="0" y="0"/>
+          <a:ext cx="0" cy="0"/>
+          <a:chOff x="0" y="0"/>
+          <a:chExt cx="0" cy="0"/>
+        </a:xfrm>
+      </p:grpSpPr>
+      <p:pic>
+        <p:nvPicPr>
+          <p:cNvPr id="2" name="Picture 1">
+            <a:extLst>
+              <a:ext uri="{FF2B5EF4-FFF2-40B4-BE49-F238E27FC236}">
+                <a16:creationId xmlns:a16="http://schemas.microsoft.com/office/drawing/2014/main" id="{0E4FD69C-4C82-4D81-8A59-201336175E42}"/>
+              </a:ext>
+            </a:extLst>
+          </p:cNvPr>
+          <p:cNvPicPr>
+            <a:picLocks noChangeAspect="1"/>
+          </p:cNvPicPr>
+          <p:nvPr/>
+        </p:nvPicPr>
+        <p:blipFill>
+          <a:blip r:embed="rId2"/>
+          <a:stretch>
+            <a:fillRect/>
+          </a:stretch>
+        </p:blipFill>
+        <p:spPr>
+          <a:xfrm>
+            <a:off x="7726742" y="2355074"/>
+            <a:ext cx="16318271" cy="8368344"/>
+          </a:xfrm>
+          <a:prstGeom prst="rect">
+            <a:avLst/>
+          </a:prstGeom>
+        </p:spPr>
+      </p:pic>
+      <p:sp>
+        <p:nvSpPr>
+          <p:cNvPr id="3" name="TextBox 2">
+            <a:extLst>
+              <a:ext uri="{FF2B5EF4-FFF2-40B4-BE49-F238E27FC236}">
+                <a16:creationId xmlns:a16="http://schemas.microsoft.com/office/drawing/2014/main" id="{620822D9-A510-45D4-8876-74460D6F03DD}"/>
+              </a:ext>
+            </a:extLst>
+          </p:cNvPr>
+          <p:cNvSpPr txBox="1"/>
+          <p:nvPr/>
+        </p:nvSpPr>
+        <p:spPr>
+          <a:xfrm>
+            <a:off x="9768387" y="718339"/>
+            <a:ext cx="4840877" cy="830997"/>
+          </a:xfrm>
+          <a:prstGeom prst="rect">
+            <a:avLst/>
+          </a:prstGeom>
+          <a:noFill/>
+        </p:spPr>
+        <p:txBody>
+          <a:bodyPr wrap="none" rtlCol="0">
+            <a:spAutoFit/>
+          </a:bodyPr>
+          <a:lstStyle/>
+          <a:p>
+            <a:pPr algn="ctr"/>
+            <a:r>
+              <a:rPr lang="en-US" sz="4800" b="1" u="sng" dirty="0"/>
+              <a:t>Model Predictions</a:t>
+            </a:r>
+          </a:p>
+        </p:txBody>
+      </p:sp>
+      <p:sp>
+        <p:nvSpPr>
+          <p:cNvPr id="4" name="TextBox 3">
+            <a:extLst>
+              <a:ext uri="{FF2B5EF4-FFF2-40B4-BE49-F238E27FC236}">
+                <a16:creationId xmlns:a16="http://schemas.microsoft.com/office/drawing/2014/main" id="{247CA501-7E7C-446C-BC51-D5C86AA374D6}"/>
+              </a:ext>
+            </a:extLst>
+          </p:cNvPr>
+          <p:cNvSpPr txBox="1"/>
+          <p:nvPr/>
+        </p:nvSpPr>
+        <p:spPr>
+          <a:xfrm>
+            <a:off x="332637" y="2669480"/>
+            <a:ext cx="7394105" cy="5077159"/>
+          </a:xfrm>
+          <a:prstGeom prst="rect">
+            <a:avLst/>
+          </a:prstGeom>
+          <a:noFill/>
+        </p:spPr>
+        <p:txBody>
+          <a:bodyPr wrap="square" rtlCol="0">
+            <a:spAutoFit/>
+          </a:bodyPr>
+          <a:lstStyle/>
+          <a:p>
+            <a:r>
+              <a:rPr lang="en-US" dirty="0"/>
+              <a:t>Using a Random Forrest model on the historical weather and load data we can now run hourly predictions on future weather forecasts. </a:t>
+            </a:r>
+          </a:p>
+          <a:p>
+            <a:endParaRPr lang="en-US" dirty="0"/>
+          </a:p>
+          <a:p>
+            <a:r>
+              <a:rPr lang="en-US" dirty="0"/>
+              <a:t>Here we have the predicted hourly load, in megawatt hours, for July 13, 2019 and using the drop down you can choose other dates through 2019.</a:t>
+            </a:r>
+          </a:p>
+        </p:txBody>
+      </p:sp>
+    </p:spTree>
+    <p:extLst>
+      <p:ext uri="{BB962C8B-B14F-4D97-AF65-F5344CB8AC3E}">
+        <p14:creationId xmlns:p14="http://schemas.microsoft.com/office/powerpoint/2010/main" val="3291956445"/>
+      </p:ext>
+    </p:extLst>
+  </p:cSld>
+  <p:clrMapOvr>
+    <a:masterClrMapping/>
+  </p:clrMapOvr>
+</p:sld>
+</file>
+
+<file path=ppt/slides/slide14.xml><?xml version="1.0" encoding="utf-8"?>
+<p:sld xmlns:a="http://schemas.openxmlformats.org/drawingml/2006/main" xmlns:r="http://schemas.openxmlformats.org/officeDocument/2006/relationships" xmlns:p="http://schemas.openxmlformats.org/presentationml/2006/main">
+  <p:cSld>
+    <p:spTree>
+      <p:nvGrpSpPr>
+        <p:cNvPr id="1" name=""/>
+        <p:cNvGrpSpPr/>
+        <p:nvPr/>
+      </p:nvGrpSpPr>
+      <p:grpSpPr>
+        <a:xfrm>
+          <a:off x="0" y="0"/>
+          <a:ext cx="0" cy="0"/>
+          <a:chOff x="0" y="0"/>
+          <a:chExt cx="0" cy="0"/>
+        </a:xfrm>
+      </p:grpSpPr>
+      <p:pic>
+        <p:nvPicPr>
+          <p:cNvPr id="2" name="Picture 1">
+            <a:extLst>
+              <a:ext uri="{FF2B5EF4-FFF2-40B4-BE49-F238E27FC236}">
+                <a16:creationId xmlns:a16="http://schemas.microsoft.com/office/drawing/2014/main" id="{18657532-D9D7-4B48-9B02-D8F357E4403F}"/>
+              </a:ext>
+            </a:extLst>
+          </p:cNvPr>
+          <p:cNvPicPr>
+            <a:picLocks noChangeAspect="1"/>
+          </p:cNvPicPr>
+          <p:nvPr/>
+        </p:nvPicPr>
+        <p:blipFill>
+          <a:blip r:embed="rId2"/>
+          <a:stretch>
+            <a:fillRect/>
+          </a:stretch>
+        </p:blipFill>
+        <p:spPr>
+          <a:xfrm>
+            <a:off x="6229428" y="1601929"/>
+            <a:ext cx="17909499" cy="8716591"/>
+          </a:xfrm>
+          <a:prstGeom prst="rect">
+            <a:avLst/>
+          </a:prstGeom>
+        </p:spPr>
+      </p:pic>
+      <p:sp>
+        <p:nvSpPr>
+          <p:cNvPr id="3" name="Rectangle 2">
+            <a:extLst>
+              <a:ext uri="{FF2B5EF4-FFF2-40B4-BE49-F238E27FC236}">
+                <a16:creationId xmlns:a16="http://schemas.microsoft.com/office/drawing/2014/main" id="{48049A4B-0FCC-4CC6-A2BB-96C6A75A0010}"/>
+              </a:ext>
+            </a:extLst>
+          </p:cNvPr>
+          <p:cNvSpPr/>
+          <p:nvPr/>
+        </p:nvSpPr>
+        <p:spPr>
+          <a:xfrm>
+            <a:off x="9778586" y="715926"/>
+            <a:ext cx="3270447" cy="646331"/>
+          </a:xfrm>
+          <a:prstGeom prst="rect">
+            <a:avLst/>
+          </a:prstGeom>
+        </p:spPr>
+        <p:txBody>
+          <a:bodyPr wrap="none">
+            <a:spAutoFit/>
+          </a:bodyPr>
+          <a:lstStyle/>
+          <a:p>
+            <a:pPr algn="ctr"/>
+            <a:r>
+              <a:rPr lang="en-US" sz="3600" b="1" u="sng" dirty="0"/>
+              <a:t>Data Dashboard</a:t>
+            </a:r>
+          </a:p>
+        </p:txBody>
+      </p:sp>
+      <p:sp>
+        <p:nvSpPr>
+          <p:cNvPr id="4" name="TextBox 3">
+            <a:extLst>
+              <a:ext uri="{FF2B5EF4-FFF2-40B4-BE49-F238E27FC236}">
+                <a16:creationId xmlns:a16="http://schemas.microsoft.com/office/drawing/2014/main" id="{31C68216-ABC6-4918-A554-6A2F64073C6F}"/>
+              </a:ext>
+            </a:extLst>
+          </p:cNvPr>
+          <p:cNvSpPr txBox="1"/>
+          <p:nvPr/>
+        </p:nvSpPr>
+        <p:spPr>
+          <a:xfrm>
+            <a:off x="315884" y="2144684"/>
+            <a:ext cx="5913544" cy="7846507"/>
+          </a:xfrm>
+          <a:prstGeom prst="rect">
+            <a:avLst/>
+          </a:prstGeom>
+          <a:noFill/>
+        </p:spPr>
+        <p:txBody>
+          <a:bodyPr wrap="square" rtlCol="0">
+            <a:spAutoFit/>
+          </a:bodyPr>
+          <a:lstStyle/>
+          <a:p>
+            <a:r>
+              <a:rPr lang="en-US" dirty="0"/>
+              <a:t>Using the different data points in the historical data we can use Tableau to build a dashboard and get more insight to how weather impacts energy loads.</a:t>
+            </a:r>
+          </a:p>
+          <a:p>
+            <a:endParaRPr lang="en-US" dirty="0"/>
+          </a:p>
+          <a:p>
+            <a:r>
+              <a:rPr lang="en-US" dirty="0"/>
+              <a:t>The months with the most energy consumed are the summer months with the hottest temperatures and weekends tend to have the lower average amount of energy consumption.</a:t>
+            </a:r>
+          </a:p>
+        </p:txBody>
+      </p:sp>
+    </p:spTree>
+    <p:extLst>
+      <p:ext uri="{BB962C8B-B14F-4D97-AF65-F5344CB8AC3E}">
+        <p14:creationId xmlns:p14="http://schemas.microsoft.com/office/powerpoint/2010/main" val="1537539993"/>
       </p:ext>
     </p:extLst>
   </p:cSld>
@@ -4045,7 +4514,7 @@
         <p:spPr>
           <a:xfrm>
             <a:off x="419349" y="3058274"/>
-            <a:ext cx="7830571" cy="4524315"/>
+            <a:ext cx="7830571" cy="5262979"/>
           </a:xfrm>
           <a:prstGeom prst="rect">
             <a:avLst/>
@@ -4065,6 +4534,16 @@
             <a:r>
               <a:rPr lang="en-US" sz="4800" dirty="0"/>
               <a:t>Dates = Hourly 2014 – 2018</a:t>
+            </a:r>
+          </a:p>
+          <a:p>
+            <a:pPr marL="571500" indent="-571500">
+              <a:buFont typeface="Arial" panose="020B0604020202020204" pitchFamily="34" charset="0"/>
+              <a:buChar char="•"/>
+            </a:pPr>
+            <a:r>
+              <a:rPr lang="en-US" sz="4800" dirty="0"/>
+              <a:t>Day of the week</a:t>
             </a:r>
           </a:p>
           <a:p>
@@ -4201,7 +4680,7 @@
         </p:blipFill>
         <p:spPr>
           <a:xfrm>
-            <a:off x="5309234" y="1168081"/>
+            <a:off x="5658368" y="1168081"/>
             <a:ext cx="18471312" cy="11817668"/>
           </a:xfrm>
           <a:prstGeom prst="rect">
@@ -4209,6 +4688,41 @@
           </a:prstGeom>
         </p:spPr>
       </p:pic>
+      <p:sp>
+        <p:nvSpPr>
+          <p:cNvPr id="3" name="TextBox 2">
+            <a:extLst>
+              <a:ext uri="{FF2B5EF4-FFF2-40B4-BE49-F238E27FC236}">
+                <a16:creationId xmlns:a16="http://schemas.microsoft.com/office/drawing/2014/main" id="{E02FC5EF-135D-4FAB-884C-C9856F0DE1F0}"/>
+              </a:ext>
+            </a:extLst>
+          </p:cNvPr>
+          <p:cNvSpPr txBox="1"/>
+          <p:nvPr/>
+        </p:nvSpPr>
+        <p:spPr>
+          <a:xfrm>
+            <a:off x="581891" y="3524596"/>
+            <a:ext cx="5076477" cy="5077159"/>
+          </a:xfrm>
+          <a:prstGeom prst="rect">
+            <a:avLst/>
+          </a:prstGeom>
+          <a:noFill/>
+        </p:spPr>
+        <p:txBody>
+          <a:bodyPr wrap="square" rtlCol="0">
+            <a:spAutoFit/>
+          </a:bodyPr>
+          <a:lstStyle/>
+          <a:p>
+            <a:r>
+              <a:rPr lang="en-US" dirty="0"/>
+              <a:t>Here we read in the historical load and weather data and create a data frame that gives each day of the week a Boolean (True = 1, False = 0) value to which day of the week the data represents.</a:t>
+            </a:r>
+          </a:p>
+        </p:txBody>
+      </p:sp>
     </p:spTree>
     <p:extLst>
       <p:ext uri="{BB962C8B-B14F-4D97-AF65-F5344CB8AC3E}">
@@ -4289,14 +4803,90 @@
         </p:blipFill>
         <p:spPr>
           <a:xfrm>
-            <a:off x="4742497" y="1461771"/>
-            <a:ext cx="19125692" cy="11299189"/>
+            <a:off x="6062097" y="1499985"/>
+            <a:ext cx="18138600" cy="10716029"/>
           </a:xfrm>
           <a:prstGeom prst="rect">
             <a:avLst/>
           </a:prstGeom>
         </p:spPr>
       </p:pic>
+      <p:sp>
+        <p:nvSpPr>
+          <p:cNvPr id="3" name="TextBox 2">
+            <a:extLst>
+              <a:ext uri="{FF2B5EF4-FFF2-40B4-BE49-F238E27FC236}">
+                <a16:creationId xmlns:a16="http://schemas.microsoft.com/office/drawing/2014/main" id="{28D8DDC7-FD12-45C7-B05B-FEDF9BEBF855}"/>
+              </a:ext>
+            </a:extLst>
+          </p:cNvPr>
+          <p:cNvSpPr txBox="1"/>
+          <p:nvPr/>
+        </p:nvSpPr>
+        <p:spPr>
+          <a:xfrm>
+            <a:off x="881149" y="3381377"/>
+            <a:ext cx="5180948" cy="6738768"/>
+          </a:xfrm>
+          <a:prstGeom prst="rect">
+            <a:avLst/>
+          </a:prstGeom>
+          <a:noFill/>
+        </p:spPr>
+        <p:txBody>
+          <a:bodyPr wrap="square" rtlCol="0">
+            <a:spAutoFit/>
+          </a:bodyPr>
+          <a:lstStyle/>
+          <a:p>
+            <a:r>
+              <a:rPr lang="en-US" dirty="0"/>
+              <a:t>Once the </a:t>
+            </a:r>
+            <a:r>
+              <a:rPr lang="en-US" dirty="0" err="1"/>
+              <a:t>dataframe</a:t>
+            </a:r>
+            <a:r>
+              <a:rPr lang="en-US" dirty="0"/>
+              <a:t> is constructed, we then set the </a:t>
+            </a:r>
+            <a:r>
+              <a:rPr lang="en-US" dirty="0" err="1"/>
+              <a:t>X,y</a:t>
+            </a:r>
+            <a:r>
+              <a:rPr lang="en-US" dirty="0"/>
+              <a:t> sets for the model. Using a </a:t>
+            </a:r>
+            <a:r>
+              <a:rPr lang="en-US" dirty="0" err="1"/>
+              <a:t>TimeSeriesSplit</a:t>
+            </a:r>
+            <a:r>
+              <a:rPr lang="en-US" dirty="0"/>
+              <a:t>, we can create the train and test splits to be run.</a:t>
+            </a:r>
+          </a:p>
+          <a:p>
+            <a:endParaRPr lang="en-US" dirty="0"/>
+          </a:p>
+          <a:p>
+            <a:r>
+              <a:rPr lang="en-US" dirty="0"/>
+              <a:t>Tuning the </a:t>
+            </a:r>
+            <a:r>
+              <a:rPr lang="en-US" dirty="0" err="1"/>
+              <a:t>RanomForrest</a:t>
+            </a:r>
+            <a:r>
+              <a:rPr lang="en-US" dirty="0"/>
+              <a:t> is crucial to prevent overfitting and then we can run and print the results. </a:t>
+            </a:r>
+          </a:p>
+        </p:txBody>
+      </p:sp>
     </p:spTree>
     <p:extLst>
       <p:ext uri="{BB962C8B-B14F-4D97-AF65-F5344CB8AC3E}">
@@ -4377,7 +4967,7 @@
         </p:blipFill>
         <p:spPr>
           <a:xfrm>
-            <a:off x="5358130" y="730251"/>
+            <a:off x="6297584" y="946382"/>
             <a:ext cx="17664430" cy="12396929"/>
           </a:xfrm>
           <a:prstGeom prst="rect">
@@ -4385,6 +4975,84 @@
           </a:prstGeom>
         </p:spPr>
       </p:pic>
+      <p:sp>
+        <p:nvSpPr>
+          <p:cNvPr id="4" name="TextBox 3">
+            <a:extLst>
+              <a:ext uri="{FF2B5EF4-FFF2-40B4-BE49-F238E27FC236}">
+                <a16:creationId xmlns:a16="http://schemas.microsoft.com/office/drawing/2014/main" id="{4F8492E6-D519-4D2A-BDA5-F30B715D0778}"/>
+              </a:ext>
+            </a:extLst>
+          </p:cNvPr>
+          <p:cNvSpPr txBox="1"/>
+          <p:nvPr/>
+        </p:nvSpPr>
+        <p:spPr>
+          <a:xfrm>
+            <a:off x="415636" y="2566730"/>
+            <a:ext cx="5881948" cy="8954246"/>
+          </a:xfrm>
+          <a:prstGeom prst="rect">
+            <a:avLst/>
+          </a:prstGeom>
+          <a:noFill/>
+        </p:spPr>
+        <p:txBody>
+          <a:bodyPr wrap="square" rtlCol="0">
+            <a:spAutoFit/>
+          </a:bodyPr>
+          <a:lstStyle/>
+          <a:p>
+            <a:r>
+              <a:rPr lang="en-US" dirty="0"/>
+              <a:t>After running the model, the test results can be put in a </a:t>
+            </a:r>
+            <a:r>
+              <a:rPr lang="en-US" dirty="0" err="1"/>
+              <a:t>dataframe</a:t>
+            </a:r>
+            <a:r>
+              <a:rPr lang="en-US" dirty="0"/>
+              <a:t> next to the actual test set to compare accuracy.</a:t>
+            </a:r>
+          </a:p>
+          <a:p>
+            <a:endParaRPr lang="en-US" dirty="0"/>
+          </a:p>
+          <a:p>
+            <a:r>
+              <a:rPr lang="en-US" dirty="0"/>
+              <a:t>The score ( r^2) returned 82.68%.</a:t>
+            </a:r>
+          </a:p>
+          <a:p>
+            <a:endParaRPr lang="en-US" dirty="0"/>
+          </a:p>
+          <a:p>
+            <a:r>
+              <a:rPr lang="en-US" dirty="0"/>
+              <a:t>From there the </a:t>
+            </a:r>
+            <a:r>
+              <a:rPr lang="en-US" dirty="0" err="1"/>
+              <a:t>dataframe</a:t>
+            </a:r>
+            <a:r>
+              <a:rPr lang="en-US" dirty="0"/>
+              <a:t> is exported t .csv to by fed into Tableau for visualization.</a:t>
+            </a:r>
+          </a:p>
+          <a:p>
+            <a:endParaRPr lang="en-US" dirty="0"/>
+          </a:p>
+          <a:p>
+            <a:r>
+              <a:rPr lang="en-US" dirty="0"/>
+              <a:t>The last step is to save the model, so it doesn’t need to be trained every time the application is run.</a:t>
+            </a:r>
+          </a:p>
+        </p:txBody>
+      </p:sp>
     </p:spTree>
     <p:extLst>
       <p:ext uri="{BB962C8B-B14F-4D97-AF65-F5344CB8AC3E}">
@@ -4465,14 +5133,67 @@
         </p:blipFill>
         <p:spPr>
           <a:xfrm>
-            <a:off x="4946967" y="730251"/>
-            <a:ext cx="18735537" cy="11990069"/>
+            <a:off x="6550429" y="1521758"/>
+            <a:ext cx="17497835" cy="11197984"/>
           </a:xfrm>
           <a:prstGeom prst="rect">
             <a:avLst/>
           </a:prstGeom>
         </p:spPr>
       </p:pic>
+      <p:sp>
+        <p:nvSpPr>
+          <p:cNvPr id="3" name="TextBox 2">
+            <a:extLst>
+              <a:ext uri="{FF2B5EF4-FFF2-40B4-BE49-F238E27FC236}">
+                <a16:creationId xmlns:a16="http://schemas.microsoft.com/office/drawing/2014/main" id="{9FC96771-BA65-40A4-9929-EF78D2A6D481}"/>
+              </a:ext>
+            </a:extLst>
+          </p:cNvPr>
+          <p:cNvSpPr txBox="1"/>
+          <p:nvPr/>
+        </p:nvSpPr>
+        <p:spPr>
+          <a:xfrm>
+            <a:off x="931025" y="3208713"/>
+            <a:ext cx="5619404" cy="6738768"/>
+          </a:xfrm>
+          <a:prstGeom prst="rect">
+            <a:avLst/>
+          </a:prstGeom>
+          <a:noFill/>
+        </p:spPr>
+        <p:txBody>
+          <a:bodyPr wrap="square" rtlCol="0">
+            <a:spAutoFit/>
+          </a:bodyPr>
+          <a:lstStyle/>
+          <a:p>
+            <a:r>
+              <a:rPr lang="en-US" dirty="0"/>
+              <a:t>To make sure the model will function correctly in the app, we open the model, check the features, and manually put in historical data to check the output.</a:t>
+            </a:r>
+          </a:p>
+          <a:p>
+            <a:endParaRPr lang="en-US" dirty="0"/>
+          </a:p>
+          <a:p>
+            <a:r>
+              <a:rPr lang="en-US" dirty="0"/>
+              <a:t>Historical Load: 1899 megawatts</a:t>
+            </a:r>
+          </a:p>
+          <a:p>
+            <a:endParaRPr lang="en-US" dirty="0"/>
+          </a:p>
+          <a:p>
+            <a:r>
+              <a:rPr lang="en-US" dirty="0"/>
+              <a:t>Predicted Load:  1853 megawatts</a:t>
+            </a:r>
+          </a:p>
+        </p:txBody>
+      </p:sp>
     </p:spTree>
     <p:extLst>
       <p:ext uri="{BB962C8B-B14F-4D97-AF65-F5344CB8AC3E}">

</xml_diff>